<commit_message>
change processing of data
</commit_message>
<xml_diff>
--- a/Presi.pptx
+++ b/Presi.pptx
@@ -6,6 +6,7 @@
   </p:sldMasterIdLst>
   <p:sldIdLst>
     <p:sldId id="256" r:id="rId2"/>
+    <p:sldId id="257" r:id="rId3"/>
   </p:sldIdLst>
   <p:sldSz cx="12192000" cy="6858000"/>
   <p:notesSz cx="6858000" cy="9144000"/>
@@ -3394,6 +3395,71 @@
 </p:sld>
 </file>
 
+<file path=ppt/slides/slide2.xml><?xml version="1.0" encoding="utf-8"?>
+<p:sld xmlns:a="http://schemas.openxmlformats.org/drawingml/2006/main" xmlns:r="http://schemas.openxmlformats.org/officeDocument/2006/relationships" xmlns:p="http://schemas.openxmlformats.org/presentationml/2006/main">
+  <p:cSld>
+    <p:spTree>
+      <p:nvGrpSpPr>
+        <p:cNvPr id="1" name=""/>
+        <p:cNvGrpSpPr/>
+        <p:nvPr/>
+      </p:nvGrpSpPr>
+      <p:grpSpPr>
+        <a:xfrm>
+          <a:off x="0" y="0"/>
+          <a:ext cx="0" cy="0"/>
+          <a:chOff x="0" y="0"/>
+          <a:chExt cx="0" cy="0"/>
+        </a:xfrm>
+      </p:grpSpPr>
+      <p:pic>
+        <p:nvPicPr>
+          <p:cNvPr id="6" name="Inhaltsplatzhalter 5" descr="Bildschirmausschnitt">
+            <a:extLst>
+              <a:ext uri="{FF2B5EF4-FFF2-40B4-BE49-F238E27FC236}">
+                <a16:creationId xmlns:a16="http://schemas.microsoft.com/office/drawing/2014/main" id="{8195210E-DD69-4818-A7AB-16318D3B787E}"/>
+              </a:ext>
+            </a:extLst>
+          </p:cNvPr>
+          <p:cNvPicPr>
+            <a:picLocks noGrp="1" noChangeAspect="1"/>
+          </p:cNvPicPr>
+          <p:nvPr>
+            <p:ph idx="1"/>
+          </p:nvPr>
+        </p:nvPicPr>
+        <p:blipFill>
+          <a:blip r:embed="rId2">
+            <a:extLst>
+              <a:ext uri="{28A0092B-C50C-407E-A947-70E740481C1C}">
+                <a14:useLocalDpi xmlns:a14="http://schemas.microsoft.com/office/drawing/2010/main" val="0"/>
+              </a:ext>
+            </a:extLst>
+          </a:blip>
+          <a:stretch>
+            <a:fillRect/>
+          </a:stretch>
+        </p:blipFill>
+        <p:spPr>
+          <a:xfrm>
+            <a:off x="1278711" y="312409"/>
+            <a:ext cx="9003618" cy="6251005"/>
+          </a:xfrm>
+        </p:spPr>
+      </p:pic>
+    </p:spTree>
+    <p:extLst>
+      <p:ext uri="{BB962C8B-B14F-4D97-AF65-F5344CB8AC3E}">
+        <p14:creationId xmlns:p14="http://schemas.microsoft.com/office/powerpoint/2010/main" val="1766006259"/>
+      </p:ext>
+    </p:extLst>
+  </p:cSld>
+  <p:clrMapOvr>
+    <a:masterClrMapping/>
+  </p:clrMapOvr>
+</p:sld>
+</file>
+
 <file path=ppt/theme/theme1.xml><?xml version="1.0" encoding="utf-8"?>
 <a:theme xmlns:a="http://schemas.openxmlformats.org/drawingml/2006/main" name="Office">
   <a:themeElements>

</xml_diff>